<commit_message>
Updated user evaluation test case plan.
</commit_message>
<xml_diff>
--- a/PROJECT WARMUP.pptx
+++ b/PROJECT WARMUP.pptx
@@ -15,7 +15,8 @@
     <p:sldId id="262" r:id="rId9"/>
     <p:sldId id="263" r:id="rId10"/>
     <p:sldId id="264" r:id="rId11"/>
-    <p:sldId id="265" r:id="rId12"/>
+    <p:sldId id="267" r:id="rId12"/>
+    <p:sldId id="265" r:id="rId13"/>
   </p:sldIdLst>
   <p:sldSz cx="12192000" cy="6858000"/>
   <p:notesSz cx="6858000" cy="9144000"/>
@@ -13503,7 +13504,7 @@
           <p:cNvPr id="5" name="Picture 4">
             <a:extLst>
               <a:ext uri="{FF2B5EF4-FFF2-40B4-BE49-F238E27FC236}">
-                <a16:creationId xmlns:a16="http://schemas.microsoft.com/office/drawing/2014/main" xmlns="" id="{6906973F-4B03-F5FD-F52D-0121CDE216CC}"/>
+                <a16:creationId xmlns="" xmlns:a16="http://schemas.microsoft.com/office/drawing/2014/main" id="{6906973F-4B03-F5FD-F52D-0121CDE216CC}"/>
               </a:ext>
             </a:extLst>
           </p:cNvPr>
@@ -13573,6 +13574,102 @@
       </p:grpSpPr>
       <p:sp>
         <p:nvSpPr>
+          <p:cNvPr id="2" name="Title 1"/>
+          <p:cNvSpPr>
+            <a:spLocks noGrp="1"/>
+          </p:cNvSpPr>
+          <p:nvPr>
+            <p:ph type="title"/>
+          </p:nvPr>
+        </p:nvSpPr>
+        <p:spPr/>
+        <p:txBody>
+          <a:bodyPr/>
+          <a:lstStyle/>
+          <a:p>
+            <a:r>
+              <a:rPr lang="en-US" dirty="0" smtClean="0"/>
+              <a:t>Use case Evaluation.</a:t>
+            </a:r>
+            <a:endParaRPr lang="en-IN" dirty="0"/>
+          </a:p>
+        </p:txBody>
+      </p:sp>
+      <p:sp>
+        <p:nvSpPr>
+          <p:cNvPr id="3" name="Content Placeholder 2"/>
+          <p:cNvSpPr>
+            <a:spLocks noGrp="1"/>
+          </p:cNvSpPr>
+          <p:nvPr>
+            <p:ph idx="1"/>
+          </p:nvPr>
+        </p:nvSpPr>
+        <p:spPr/>
+        <p:txBody>
+          <a:bodyPr/>
+          <a:lstStyle/>
+          <a:p>
+            <a:r>
+              <a:rPr lang="en-US" dirty="0" smtClean="0"/>
+              <a:t>Here, we will define limited scope of around 10 to 15 items such as fruits, vegetable and we will train the computer vision model to identify the item uploaded by user. As currently, we do not have plan to purchase </a:t>
+            </a:r>
+            <a:r>
+              <a:rPr lang="en-US" dirty="0" err="1" smtClean="0"/>
+              <a:t>api</a:t>
+            </a:r>
+            <a:r>
+              <a:rPr lang="en-US" dirty="0" smtClean="0"/>
+              <a:t> key for existing real world ecommerce data, so we will develop dummy data for such 15 items in 3 e-commerce database and call the </a:t>
+            </a:r>
+            <a:r>
+              <a:rPr lang="en-US" dirty="0" err="1" smtClean="0"/>
+              <a:t>api</a:t>
+            </a:r>
+            <a:r>
+              <a:rPr lang="en-US" dirty="0" smtClean="0"/>
+              <a:t> to fetch price of each item based on selected uploaded item. So based on that user can verify the item and evaluate the functionality and reliability of </a:t>
+            </a:r>
+            <a:r>
+              <a:rPr lang="en-US" smtClean="0"/>
+              <a:t>the project.</a:t>
+            </a:r>
+            <a:endParaRPr lang="en-IN" dirty="0"/>
+          </a:p>
+        </p:txBody>
+      </p:sp>
+    </p:spTree>
+    <p:extLst>
+      <p:ext uri="{BB962C8B-B14F-4D97-AF65-F5344CB8AC3E}">
+        <p14:creationId xmlns:p14="http://schemas.microsoft.com/office/powerpoint/2010/main" val="1883285439"/>
+      </p:ext>
+    </p:extLst>
+  </p:cSld>
+  <p:clrMapOvr>
+    <a:masterClrMapping/>
+  </p:clrMapOvr>
+</p:sld>
+</file>
+
+<file path=ppt/slides/slide12.xml><?xml version="1.0" encoding="utf-8"?>
+<p:sld xmlns:a="http://schemas.openxmlformats.org/drawingml/2006/main" xmlns:r="http://schemas.openxmlformats.org/officeDocument/2006/relationships" xmlns:p="http://schemas.openxmlformats.org/presentationml/2006/main">
+  <p:cSld>
+    <p:spTree>
+      <p:nvGrpSpPr>
+        <p:cNvPr id="1" name=""/>
+        <p:cNvGrpSpPr/>
+        <p:nvPr/>
+      </p:nvGrpSpPr>
+      <p:grpSpPr>
+        <a:xfrm>
+          <a:off x="0" y="0"/>
+          <a:ext cx="0" cy="0"/>
+          <a:chOff x="0" y="0"/>
+          <a:chExt cx="0" cy="0"/>
+        </a:xfrm>
+      </p:grpSpPr>
+      <p:sp>
+        <p:nvSpPr>
           <p:cNvPr id="3" name="Content Placeholder 2"/>
           <p:cNvSpPr>
             <a:spLocks noGrp="1"/>
@@ -13753,7 +13850,7 @@
           <p:cNvPr id="5" name="Picture 4">
             <a:extLst>
               <a:ext uri="{FF2B5EF4-FFF2-40B4-BE49-F238E27FC236}">
-                <a16:creationId xmlns:a16="http://schemas.microsoft.com/office/drawing/2014/main" xmlns="" id="{246DC516-8729-D2F9-1EFB-275E717BBAD0}"/>
+                <a16:creationId xmlns="" xmlns:a16="http://schemas.microsoft.com/office/drawing/2014/main" id="{246DC516-8729-D2F9-1EFB-275E717BBAD0}"/>
               </a:ext>
             </a:extLst>
           </p:cNvPr>
@@ -13897,7 +13994,7 @@
           <p:cNvPr id="5" name="Picture 4">
             <a:extLst>
               <a:ext uri="{FF2B5EF4-FFF2-40B4-BE49-F238E27FC236}">
-                <a16:creationId xmlns:a16="http://schemas.microsoft.com/office/drawing/2014/main" xmlns="" id="{8FC7E703-1DC0-730D-E515-7B9C0C77791F}"/>
+                <a16:creationId xmlns="" xmlns:a16="http://schemas.microsoft.com/office/drawing/2014/main" id="{8FC7E703-1DC0-730D-E515-7B9C0C77791F}"/>
               </a:ext>
             </a:extLst>
           </p:cNvPr>
@@ -13970,7 +14067,7 @@
           <p:cNvPr id="3" name="Rectangle 2">
             <a:extLst>
               <a:ext uri="{FF2B5EF4-FFF2-40B4-BE49-F238E27FC236}">
-                <a16:creationId xmlns:a16="http://schemas.microsoft.com/office/drawing/2014/main" xmlns="" id="{88A79C7F-9543-B285-1C70-E902C617E9F3}"/>
+                <a16:creationId xmlns="" xmlns:a16="http://schemas.microsoft.com/office/drawing/2014/main" id="{88A79C7F-9543-B285-1C70-E902C617E9F3}"/>
               </a:ext>
             </a:extLst>
           </p:cNvPr>
@@ -14017,7 +14114,7 @@
           <p:cNvPr id="4" name="Rectangle 3">
             <a:extLst>
               <a:ext uri="{FF2B5EF4-FFF2-40B4-BE49-F238E27FC236}">
-                <a16:creationId xmlns:a16="http://schemas.microsoft.com/office/drawing/2014/main" xmlns="" id="{8D0BAC9E-0A29-F3A9-56FB-090F80D51B95}"/>
+                <a16:creationId xmlns="" xmlns:a16="http://schemas.microsoft.com/office/drawing/2014/main" id="{8D0BAC9E-0A29-F3A9-56FB-090F80D51B95}"/>
               </a:ext>
             </a:extLst>
           </p:cNvPr>
@@ -14064,7 +14161,7 @@
           <p:cNvPr id="5" name="Rectangle 4">
             <a:extLst>
               <a:ext uri="{FF2B5EF4-FFF2-40B4-BE49-F238E27FC236}">
-                <a16:creationId xmlns:a16="http://schemas.microsoft.com/office/drawing/2014/main" xmlns="" id="{51C85FDA-45A7-9713-C71A-1F32313AF4FA}"/>
+                <a16:creationId xmlns="" xmlns:a16="http://schemas.microsoft.com/office/drawing/2014/main" id="{51C85FDA-45A7-9713-C71A-1F32313AF4FA}"/>
               </a:ext>
             </a:extLst>
           </p:cNvPr>
@@ -14111,7 +14208,7 @@
           <p:cNvPr id="6" name="Rectangle 5">
             <a:extLst>
               <a:ext uri="{FF2B5EF4-FFF2-40B4-BE49-F238E27FC236}">
-                <a16:creationId xmlns:a16="http://schemas.microsoft.com/office/drawing/2014/main" xmlns="" id="{1F626A97-17E8-410D-5F31-AC41285160D2}"/>
+                <a16:creationId xmlns="" xmlns:a16="http://schemas.microsoft.com/office/drawing/2014/main" id="{1F626A97-17E8-410D-5F31-AC41285160D2}"/>
               </a:ext>
             </a:extLst>
           </p:cNvPr>
@@ -14158,7 +14255,7 @@
           <p:cNvPr id="7" name="Rectangle 6">
             <a:extLst>
               <a:ext uri="{FF2B5EF4-FFF2-40B4-BE49-F238E27FC236}">
-                <a16:creationId xmlns:a16="http://schemas.microsoft.com/office/drawing/2014/main" xmlns="" id="{D5C80A7F-20DF-4A58-765A-D0AD713B36EC}"/>
+                <a16:creationId xmlns="" xmlns:a16="http://schemas.microsoft.com/office/drawing/2014/main" id="{D5C80A7F-20DF-4A58-765A-D0AD713B36EC}"/>
               </a:ext>
             </a:extLst>
           </p:cNvPr>
@@ -14205,7 +14302,7 @@
           <p:cNvPr id="8" name="Rectangle 7">
             <a:extLst>
               <a:ext uri="{FF2B5EF4-FFF2-40B4-BE49-F238E27FC236}">
-                <a16:creationId xmlns:a16="http://schemas.microsoft.com/office/drawing/2014/main" xmlns="" id="{E135FDAD-597B-6123-BA01-D1749514BCA2}"/>
+                <a16:creationId xmlns="" xmlns:a16="http://schemas.microsoft.com/office/drawing/2014/main" id="{E135FDAD-597B-6123-BA01-D1749514BCA2}"/>
               </a:ext>
             </a:extLst>
           </p:cNvPr>
@@ -14252,7 +14349,7 @@
           <p:cNvPr id="9" name="Rectangle 8">
             <a:extLst>
               <a:ext uri="{FF2B5EF4-FFF2-40B4-BE49-F238E27FC236}">
-                <a16:creationId xmlns:a16="http://schemas.microsoft.com/office/drawing/2014/main" xmlns="" id="{F57488CB-C167-F142-4816-EE2E1BAEFFDF}"/>
+                <a16:creationId xmlns="" xmlns:a16="http://schemas.microsoft.com/office/drawing/2014/main" id="{F57488CB-C167-F142-4816-EE2E1BAEFFDF}"/>
               </a:ext>
             </a:extLst>
           </p:cNvPr>
@@ -14299,7 +14396,7 @@
           <p:cNvPr id="10" name="Rectangle 9">
             <a:extLst>
               <a:ext uri="{FF2B5EF4-FFF2-40B4-BE49-F238E27FC236}">
-                <a16:creationId xmlns:a16="http://schemas.microsoft.com/office/drawing/2014/main" xmlns="" id="{29C0D257-0E4B-B45F-1B97-F5C5F6F752A8}"/>
+                <a16:creationId xmlns="" xmlns:a16="http://schemas.microsoft.com/office/drawing/2014/main" id="{29C0D257-0E4B-B45F-1B97-F5C5F6F752A8}"/>
               </a:ext>
             </a:extLst>
           </p:cNvPr>
@@ -14346,7 +14443,7 @@
           <p:cNvPr id="11" name="Rectangle 10">
             <a:extLst>
               <a:ext uri="{FF2B5EF4-FFF2-40B4-BE49-F238E27FC236}">
-                <a16:creationId xmlns:a16="http://schemas.microsoft.com/office/drawing/2014/main" xmlns="" id="{204D5F34-E24E-35FB-E2CA-C2D8955143A4}"/>
+                <a16:creationId xmlns="" xmlns:a16="http://schemas.microsoft.com/office/drawing/2014/main" id="{204D5F34-E24E-35FB-E2CA-C2D8955143A4}"/>
               </a:ext>
             </a:extLst>
           </p:cNvPr>
@@ -14393,7 +14490,7 @@
           <p:cNvPr id="19" name="Connector: Elbow 18">
             <a:extLst>
               <a:ext uri="{FF2B5EF4-FFF2-40B4-BE49-F238E27FC236}">
-                <a16:creationId xmlns:a16="http://schemas.microsoft.com/office/drawing/2014/main" xmlns="" id="{9F636065-CE9B-3BF9-9D6A-4FB3DCCEF19E}"/>
+                <a16:creationId xmlns="" xmlns:a16="http://schemas.microsoft.com/office/drawing/2014/main" id="{9F636065-CE9B-3BF9-9D6A-4FB3DCCEF19E}"/>
               </a:ext>
             </a:extLst>
           </p:cNvPr>
@@ -14438,7 +14535,7 @@
           <p:cNvPr id="24" name="Connector: Elbow 23">
             <a:extLst>
               <a:ext uri="{FF2B5EF4-FFF2-40B4-BE49-F238E27FC236}">
-                <a16:creationId xmlns:a16="http://schemas.microsoft.com/office/drawing/2014/main" xmlns="" id="{AE360BA1-EB3D-196C-2AD7-6EF0C530227C}"/>
+                <a16:creationId xmlns="" xmlns:a16="http://schemas.microsoft.com/office/drawing/2014/main" id="{AE360BA1-EB3D-196C-2AD7-6EF0C530227C}"/>
               </a:ext>
             </a:extLst>
           </p:cNvPr>
@@ -14480,7 +14577,7 @@
           <p:cNvPr id="33" name="Connector: Elbow 32">
             <a:extLst>
               <a:ext uri="{FF2B5EF4-FFF2-40B4-BE49-F238E27FC236}">
-                <a16:creationId xmlns:a16="http://schemas.microsoft.com/office/drawing/2014/main" xmlns="" id="{1BC700C8-ACAF-227E-41DB-67A049E266A9}"/>
+                <a16:creationId xmlns="" xmlns:a16="http://schemas.microsoft.com/office/drawing/2014/main" id="{1BC700C8-ACAF-227E-41DB-67A049E266A9}"/>
               </a:ext>
             </a:extLst>
           </p:cNvPr>
@@ -14523,7 +14620,7 @@
           <p:cNvPr id="36" name="Straight Arrow Connector 35">
             <a:extLst>
               <a:ext uri="{FF2B5EF4-FFF2-40B4-BE49-F238E27FC236}">
-                <a16:creationId xmlns:a16="http://schemas.microsoft.com/office/drawing/2014/main" xmlns="" id="{978570AF-61BF-66FA-9E17-F3F5191C299C}"/>
+                <a16:creationId xmlns="" xmlns:a16="http://schemas.microsoft.com/office/drawing/2014/main" id="{978570AF-61BF-66FA-9E17-F3F5191C299C}"/>
               </a:ext>
             </a:extLst>
           </p:cNvPr>
@@ -14565,7 +14662,7 @@
           <p:cNvPr id="39" name="Connector: Elbow 38">
             <a:extLst>
               <a:ext uri="{FF2B5EF4-FFF2-40B4-BE49-F238E27FC236}">
-                <a16:creationId xmlns:a16="http://schemas.microsoft.com/office/drawing/2014/main" xmlns="" id="{10E0E1A7-7915-AD19-81D7-06FD161C7B65}"/>
+                <a16:creationId xmlns="" xmlns:a16="http://schemas.microsoft.com/office/drawing/2014/main" id="{10E0E1A7-7915-AD19-81D7-06FD161C7B65}"/>
               </a:ext>
             </a:extLst>
           </p:cNvPr>
@@ -14607,7 +14704,7 @@
           <p:cNvPr id="42" name="Connector: Elbow 41">
             <a:extLst>
               <a:ext uri="{FF2B5EF4-FFF2-40B4-BE49-F238E27FC236}">
-                <a16:creationId xmlns:a16="http://schemas.microsoft.com/office/drawing/2014/main" xmlns="" id="{0B066972-BB9C-E2E5-07F5-75CD835FCDC6}"/>
+                <a16:creationId xmlns="" xmlns:a16="http://schemas.microsoft.com/office/drawing/2014/main" id="{0B066972-BB9C-E2E5-07F5-75CD835FCDC6}"/>
               </a:ext>
             </a:extLst>
           </p:cNvPr>
@@ -14650,7 +14747,7 @@
           <p:cNvPr id="45" name="Straight Arrow Connector 44">
             <a:extLst>
               <a:ext uri="{FF2B5EF4-FFF2-40B4-BE49-F238E27FC236}">
-                <a16:creationId xmlns:a16="http://schemas.microsoft.com/office/drawing/2014/main" xmlns="" id="{93E485DA-6839-992A-219D-53A3273AB4BF}"/>
+                <a16:creationId xmlns="" xmlns:a16="http://schemas.microsoft.com/office/drawing/2014/main" id="{93E485DA-6839-992A-219D-53A3273AB4BF}"/>
               </a:ext>
             </a:extLst>
           </p:cNvPr>
@@ -14692,7 +14789,7 @@
           <p:cNvPr id="48" name="Connector: Elbow 47">
             <a:extLst>
               <a:ext uri="{FF2B5EF4-FFF2-40B4-BE49-F238E27FC236}">
-                <a16:creationId xmlns:a16="http://schemas.microsoft.com/office/drawing/2014/main" xmlns="" id="{10A28500-03D2-52AC-D791-4711E06EF25B}"/>
+                <a16:creationId xmlns="" xmlns:a16="http://schemas.microsoft.com/office/drawing/2014/main" id="{10A28500-03D2-52AC-D791-4711E06EF25B}"/>
               </a:ext>
             </a:extLst>
           </p:cNvPr>
@@ -15623,6 +15720,30 @@
           </a:p>
         </p:txBody>
       </p:sp>
+      <p:pic>
+        <p:nvPicPr>
+          <p:cNvPr id="4" name="Picture 3"/>
+          <p:cNvPicPr>
+            <a:picLocks noChangeAspect="1"/>
+          </p:cNvPicPr>
+          <p:nvPr/>
+        </p:nvPicPr>
+        <p:blipFill>
+          <a:blip r:embed="rId2"/>
+          <a:stretch>
+            <a:fillRect/>
+          </a:stretch>
+        </p:blipFill>
+        <p:spPr>
+          <a:xfrm>
+            <a:off x="9213492" y="2976630"/>
+            <a:ext cx="2857500" cy="1600200"/>
+          </a:xfrm>
+          <a:prstGeom prst="rect">
+            <a:avLst/>
+          </a:prstGeom>
+        </p:spPr>
+      </p:pic>
     </p:spTree>
     <p:extLst>
       <p:ext uri="{BB962C8B-B14F-4D97-AF65-F5344CB8AC3E}">

</xml_diff>